<commit_message>
Updated Flow.pptx Nov 11
</commit_message>
<xml_diff>
--- a/handin/Flow.pptx
+++ b/handin/Flow.pptx
@@ -203,7 +203,7 @@
             <a:fld id="{1EA83EF2-A169-4E4F-98E7-BC0C18C6E0BC}" type="datetimeFigureOut">
               <a:rPr lang="en-US" smtClean="0"/>
               <a:pPr/>
-              <a:t>11/3/2010</a:t>
+              <a:t>11/11/2010</a:t>
             </a:fld>
             <a:endParaRPr lang="en-US"/>
           </a:p>
@@ -1553,7 +1553,7 @@
             <a:fld id="{732979C2-7319-438A-96E4-F9B09D12820E}" type="datetimeFigureOut">
               <a:rPr lang="en-US" smtClean="0"/>
               <a:pPr/>
-              <a:t>11/3/2010</a:t>
+              <a:t>11/11/2010</a:t>
             </a:fld>
             <a:endParaRPr lang="en-US"/>
           </a:p>
@@ -1720,7 +1720,7 @@
             <a:fld id="{732979C2-7319-438A-96E4-F9B09D12820E}" type="datetimeFigureOut">
               <a:rPr lang="en-US" smtClean="0"/>
               <a:pPr/>
-              <a:t>11/3/2010</a:t>
+              <a:t>11/11/2010</a:t>
             </a:fld>
             <a:endParaRPr lang="en-US"/>
           </a:p>
@@ -1897,7 +1897,7 @@
             <a:fld id="{732979C2-7319-438A-96E4-F9B09D12820E}" type="datetimeFigureOut">
               <a:rPr lang="en-US" smtClean="0"/>
               <a:pPr/>
-              <a:t>11/3/2010</a:t>
+              <a:t>11/11/2010</a:t>
             </a:fld>
             <a:endParaRPr lang="en-US"/>
           </a:p>
@@ -2064,7 +2064,7 @@
             <a:fld id="{732979C2-7319-438A-96E4-F9B09D12820E}" type="datetimeFigureOut">
               <a:rPr lang="en-US" smtClean="0"/>
               <a:pPr/>
-              <a:t>11/3/2010</a:t>
+              <a:t>11/11/2010</a:t>
             </a:fld>
             <a:endParaRPr lang="en-US"/>
           </a:p>
@@ -2307,7 +2307,7 @@
             <a:fld id="{732979C2-7319-438A-96E4-F9B09D12820E}" type="datetimeFigureOut">
               <a:rPr lang="en-US" smtClean="0"/>
               <a:pPr/>
-              <a:t>11/3/2010</a:t>
+              <a:t>11/11/2010</a:t>
             </a:fld>
             <a:endParaRPr lang="en-US"/>
           </a:p>
@@ -2592,7 +2592,7 @@
             <a:fld id="{732979C2-7319-438A-96E4-F9B09D12820E}" type="datetimeFigureOut">
               <a:rPr lang="en-US" smtClean="0"/>
               <a:pPr/>
-              <a:t>11/3/2010</a:t>
+              <a:t>11/11/2010</a:t>
             </a:fld>
             <a:endParaRPr lang="en-US"/>
           </a:p>
@@ -3011,7 +3011,7 @@
             <a:fld id="{732979C2-7319-438A-96E4-F9B09D12820E}" type="datetimeFigureOut">
               <a:rPr lang="en-US" smtClean="0"/>
               <a:pPr/>
-              <a:t>11/3/2010</a:t>
+              <a:t>11/11/2010</a:t>
             </a:fld>
             <a:endParaRPr lang="en-US"/>
           </a:p>
@@ -3126,7 +3126,7 @@
             <a:fld id="{732979C2-7319-438A-96E4-F9B09D12820E}" type="datetimeFigureOut">
               <a:rPr lang="en-US" smtClean="0"/>
               <a:pPr/>
-              <a:t>11/3/2010</a:t>
+              <a:t>11/11/2010</a:t>
             </a:fld>
             <a:endParaRPr lang="en-US"/>
           </a:p>
@@ -3218,7 +3218,7 @@
             <a:fld id="{732979C2-7319-438A-96E4-F9B09D12820E}" type="datetimeFigureOut">
               <a:rPr lang="en-US" smtClean="0"/>
               <a:pPr/>
-              <a:t>11/3/2010</a:t>
+              <a:t>11/11/2010</a:t>
             </a:fld>
             <a:endParaRPr lang="en-US"/>
           </a:p>
@@ -3492,7 +3492,7 @@
             <a:fld id="{732979C2-7319-438A-96E4-F9B09D12820E}" type="datetimeFigureOut">
               <a:rPr lang="en-US" smtClean="0"/>
               <a:pPr/>
-              <a:t>11/3/2010</a:t>
+              <a:t>11/11/2010</a:t>
             </a:fld>
             <a:endParaRPr lang="en-US"/>
           </a:p>
@@ -3742,7 +3742,7 @@
             <a:fld id="{732979C2-7319-438A-96E4-F9B09D12820E}" type="datetimeFigureOut">
               <a:rPr lang="en-US" smtClean="0"/>
               <a:pPr/>
-              <a:t>11/3/2010</a:t>
+              <a:t>11/11/2010</a:t>
             </a:fld>
             <a:endParaRPr lang="en-US"/>
           </a:p>
@@ -3952,7 +3952,7 @@
             <a:fld id="{732979C2-7319-438A-96E4-F9B09D12820E}" type="datetimeFigureOut">
               <a:rPr lang="en-US" smtClean="0"/>
               <a:pPr/>
-              <a:t>11/3/2010</a:t>
+              <a:t>11/11/2010</a:t>
             </a:fld>
             <a:endParaRPr lang="en-US"/>
           </a:p>
@@ -5600,22 +5600,14 @@
           <a:p>
             <a:r>
               <a:rPr lang="en-US" dirty="0" smtClean="0"/>
-              <a:t>Analyze and Predict </a:t>
-            </a:r>
-            <a:r>
-              <a:rPr lang="en-US" dirty="0" smtClean="0"/>
-              <a:t>Stocks</a:t>
+              <a:t>Analyze and Predict Stocks</a:t>
             </a:r>
             <a:br>
               <a:rPr lang="en-US" dirty="0" smtClean="0"/>
             </a:br>
             <a:r>
               <a:rPr lang="en-US" dirty="0" smtClean="0"/>
-              <a:t>End </a:t>
-            </a:r>
-            <a:r>
-              <a:rPr lang="en-US" dirty="0" smtClean="0"/>
-              <a:t>Date Selection</a:t>
+              <a:t>End Date Selection</a:t>
             </a:r>
             <a:endParaRPr lang="en-US" dirty="0"/>
           </a:p>
@@ -8939,7 +8931,11 @@
           <a:p>
             <a:r>
               <a:rPr lang="en-US" dirty="0" smtClean="0"/>
-              <a:t>Portfolio Summary</a:t>
+              <a:t>Portfolio One </a:t>
+            </a:r>
+            <a:r>
+              <a:rPr lang="en-US" dirty="0" smtClean="0"/>
+              <a:t>Summary</a:t>
             </a:r>
             <a:endParaRPr lang="en-US" dirty="0"/>
           </a:p>
@@ -8984,8 +8980,13 @@
             </a:pPr>
             <a:r>
               <a:rPr lang="en-US" dirty="0" smtClean="0"/>
-              <a:t>Stock Two</a:t>
-            </a:r>
+              <a:t>Stock </a:t>
+            </a:r>
+            <a:r>
+              <a:rPr lang="en-US" dirty="0" smtClean="0"/>
+              <a:t>Two </a:t>
+            </a:r>
+            <a:endParaRPr lang="en-US" dirty="0" smtClean="0"/>
           </a:p>
           <a:p>
             <a:pPr lvl="1">
@@ -9233,7 +9234,7 @@
             <a:pPr algn="ctr"/>
             <a:r>
               <a:rPr lang="en-US" dirty="0" smtClean="0"/>
-              <a:t>Analyze/Predict</a:t>
+              <a:t>Portfolio Statistics</a:t>
             </a:r>
             <a:endParaRPr lang="en-US" dirty="0"/>
           </a:p>
@@ -9241,7 +9242,7 @@
       </p:sp>
       <p:sp>
         <p:nvSpPr>
-          <p:cNvPr id="10" name="Rounded Rectangle 9">
+          <p:cNvPr id="11" name="Rounded Rectangle 10">
             <a:hlinkClick r:id="rId7" action="ppaction://hlinksldjump"/>
           </p:cNvPr>
           <p:cNvSpPr/>
@@ -9249,7 +9250,7 @@
         </p:nvSpPr>
         <p:spPr>
           <a:xfrm>
-            <a:off x="1066800" y="4419600"/>
+            <a:off x="1143000" y="4572000"/>
             <a:ext cx="1752600" cy="381000"/>
           </a:xfrm>
           <a:prstGeom prst="roundRect">
@@ -9279,7 +9280,7 @@
             <a:pPr algn="ctr"/>
             <a:r>
               <a:rPr lang="en-US" dirty="0" smtClean="0"/>
-              <a:t>Buy</a:t>
+              <a:t>Sell</a:t>
             </a:r>
             <a:endParaRPr lang="en-US" dirty="0"/>
           </a:p>
@@ -9287,54 +9288,8 @@
       </p:sp>
       <p:sp>
         <p:nvSpPr>
-          <p:cNvPr id="11" name="Rounded Rectangle 10">
-            <a:hlinkClick r:id="rId8" action="ppaction://hlinksldjump"/>
-          </p:cNvPr>
-          <p:cNvSpPr/>
-          <p:nvPr/>
-        </p:nvSpPr>
-        <p:spPr>
-          <a:xfrm>
-            <a:off x="3048000" y="4419600"/>
-            <a:ext cx="1752600" cy="381000"/>
-          </a:xfrm>
-          <a:prstGeom prst="roundRect">
-            <a:avLst/>
-          </a:prstGeom>
-        </p:spPr>
-        <p:style>
-          <a:lnRef idx="2">
-            <a:schemeClr val="accent1">
-              <a:shade val="50000"/>
-            </a:schemeClr>
-          </a:lnRef>
-          <a:fillRef idx="1">
-            <a:schemeClr val="accent1"/>
-          </a:fillRef>
-          <a:effectRef idx="0">
-            <a:schemeClr val="accent1"/>
-          </a:effectRef>
-          <a:fontRef idx="minor">
-            <a:schemeClr val="lt1"/>
-          </a:fontRef>
-        </p:style>
-        <p:txBody>
-          <a:bodyPr rtlCol="0" anchor="ctr"/>
-          <a:lstStyle/>
-          <a:p>
-            <a:pPr algn="ctr"/>
-            <a:r>
-              <a:rPr lang="en-US" dirty="0" smtClean="0"/>
-              <a:t>Sell</a:t>
-            </a:r>
-            <a:endParaRPr lang="en-US" dirty="0"/>
-          </a:p>
-        </p:txBody>
-      </p:sp>
-      <p:sp>
-        <p:nvSpPr>
           <p:cNvPr id="13" name="Rounded Rectangle 12">
-            <a:hlinkClick r:id="rId8" action="ppaction://hlinksldjump"/>
+            <a:hlinkClick r:id="rId7" action="ppaction://hlinksldjump"/>
           </p:cNvPr>
           <p:cNvSpPr/>
           <p:nvPr/>
@@ -10169,45 +10124,55 @@
               <a:rPr lang="en-US" dirty="0" smtClean="0"/>
               <a:t>Enter Search: </a:t>
             </a:r>
-          </a:p>
-          <a:p>
-            <a:endParaRPr lang="en-US" dirty="0" smtClean="0"/>
+            <a:r>
+              <a:rPr lang="en-US" dirty="0" smtClean="0"/>
+              <a:t>Drop Down Menu</a:t>
+            </a:r>
           </a:p>
           <a:p>
             <a:pPr lvl="1">
-              <a:buFont typeface="Wingdings" pitchFamily="2" charset="2"/>
-              <a:buChar char="q"/>
-            </a:pPr>
-            <a:r>
-              <a:rPr lang="en-US" dirty="0" smtClean="0"/>
-              <a:t>Stock Five</a:t>
-            </a:r>
-          </a:p>
-          <a:p>
-            <a:pPr lvl="1">
-              <a:buFont typeface="Wingdings" pitchFamily="2" charset="2"/>
-              <a:buChar char="q"/>
-            </a:pPr>
-            <a:r>
-              <a:rPr lang="en-US" dirty="0" smtClean="0"/>
-              <a:t>Stock Six</a:t>
-            </a:r>
-            <a:br>
-              <a:rPr lang="en-US" dirty="0" smtClean="0"/>
-            </a:br>
-            <a:endParaRPr lang="en-US" dirty="0" smtClean="0"/>
-          </a:p>
-          <a:p>
-            <a:pPr>
               <a:buNone/>
             </a:pPr>
+            <a:r>
+              <a:rPr lang="en-US" dirty="0" smtClean="0"/>
+              <a:t>(Print) Cash </a:t>
+            </a:r>
+            <a:r>
+              <a:rPr lang="en-US" dirty="0" smtClean="0"/>
+              <a:t>Available : XXXX</a:t>
+            </a:r>
+          </a:p>
+          <a:p>
+            <a:pPr lvl="1">
+              <a:buNone/>
+            </a:pPr>
+            <a:r>
+              <a:rPr lang="en-US" dirty="0" smtClean="0"/>
+              <a:t>Enter Investment Amount: </a:t>
+            </a:r>
+            <a:endParaRPr lang="en-US" dirty="0" smtClean="0"/>
+          </a:p>
+          <a:p>
+            <a:pPr lvl="1">
+              <a:buNone/>
+            </a:pPr>
+            <a:r>
+              <a:rPr lang="en-US" dirty="0" smtClean="0"/>
+              <a:t>Enter </a:t>
+            </a:r>
+            <a:r>
+              <a:rPr lang="en-US" dirty="0" smtClean="0"/>
+              <a:t>Date Purchased: [default is today]</a:t>
+            </a:r>
+          </a:p>
+          <a:p>
             <a:endParaRPr lang="en-US" dirty="0"/>
           </a:p>
         </p:txBody>
       </p:sp>
       <p:sp>
         <p:nvSpPr>
-          <p:cNvPr id="4" name="Rounded Rectangle 3">
+          <p:cNvPr id="6" name="Rounded Rectangle 5">
             <a:hlinkClick r:id="rId3" action="ppaction://hlinksldjump"/>
           </p:cNvPr>
           <p:cNvSpPr/>
@@ -10215,93 +10180,7 @@
         </p:nvSpPr>
         <p:spPr>
           <a:xfrm>
-            <a:off x="5943600" y="1752600"/>
-            <a:ext cx="1905000" cy="457200"/>
-          </a:xfrm>
-          <a:prstGeom prst="roundRect">
-            <a:avLst/>
-          </a:prstGeom>
-        </p:spPr>
-        <p:style>
-          <a:lnRef idx="2">
-            <a:schemeClr val="accent1">
-              <a:shade val="50000"/>
-            </a:schemeClr>
-          </a:lnRef>
-          <a:fillRef idx="1">
-            <a:schemeClr val="accent1"/>
-          </a:fillRef>
-          <a:effectRef idx="0">
-            <a:schemeClr val="accent1"/>
-          </a:effectRef>
-          <a:fontRef idx="minor">
-            <a:schemeClr val="lt1"/>
-          </a:fontRef>
-        </p:style>
-        <p:txBody>
-          <a:bodyPr rtlCol="0" anchor="ctr"/>
-          <a:lstStyle/>
-          <a:p>
-            <a:pPr algn="ctr"/>
-            <a:r>
-              <a:rPr lang="en-US" dirty="0" smtClean="0"/>
-              <a:t>Search</a:t>
-            </a:r>
-            <a:endParaRPr lang="en-US" dirty="0"/>
-          </a:p>
-        </p:txBody>
-      </p:sp>
-      <p:sp>
-        <p:nvSpPr>
-          <p:cNvPr id="5" name="Rectangle 4"/>
-          <p:cNvSpPr/>
-          <p:nvPr/>
-        </p:nvSpPr>
-        <p:spPr>
-          <a:xfrm>
-            <a:off x="3200400" y="1676400"/>
-            <a:ext cx="2057400" cy="533400"/>
-          </a:xfrm>
-          <a:prstGeom prst="rect">
-            <a:avLst/>
-          </a:prstGeom>
-        </p:spPr>
-        <p:style>
-          <a:lnRef idx="2">
-            <a:schemeClr val="dk1"/>
-          </a:lnRef>
-          <a:fillRef idx="1">
-            <a:schemeClr val="lt1"/>
-          </a:fillRef>
-          <a:effectRef idx="0">
-            <a:schemeClr val="dk1"/>
-          </a:effectRef>
-          <a:fontRef idx="minor">
-            <a:schemeClr val="dk1"/>
-          </a:fontRef>
-        </p:style>
-        <p:txBody>
-          <a:bodyPr rtlCol="0" anchor="ctr"/>
-          <a:lstStyle/>
-          <a:p>
-            <a:endParaRPr lang="en-US" dirty="0">
-              <a:latin typeface="Times New Roman" pitchFamily="18" charset="0"/>
-              <a:cs typeface="Times New Roman" pitchFamily="18" charset="0"/>
-            </a:endParaRPr>
-          </a:p>
-        </p:txBody>
-      </p:sp>
-      <p:sp>
-        <p:nvSpPr>
-          <p:cNvPr id="6" name="Rounded Rectangle 5">
-            <a:hlinkClick r:id="rId4" action="ppaction://hlinksldjump"/>
-          </p:cNvPr>
-          <p:cNvSpPr/>
-          <p:nvPr/>
-        </p:nvSpPr>
-        <p:spPr>
-          <a:xfrm>
-            <a:off x="2362200" y="4572000"/>
+            <a:off x="2286000" y="4572000"/>
             <a:ext cx="2286000" cy="838200"/>
           </a:xfrm>
           <a:prstGeom prst="roundRect">
@@ -10334,6 +10213,47 @@
               <a:t>Buy</a:t>
             </a:r>
             <a:endParaRPr lang="en-US" dirty="0"/>
+          </a:p>
+        </p:txBody>
+      </p:sp>
+      <p:sp>
+        <p:nvSpPr>
+          <p:cNvPr id="7" name="Rectangle 6"/>
+          <p:cNvSpPr/>
+          <p:nvPr/>
+        </p:nvSpPr>
+        <p:spPr>
+          <a:xfrm>
+            <a:off x="5029200" y="2819400"/>
+            <a:ext cx="1219200" cy="304800"/>
+          </a:xfrm>
+          <a:prstGeom prst="rect">
+            <a:avLst/>
+          </a:prstGeom>
+          <a:noFill/>
+        </p:spPr>
+        <p:style>
+          <a:lnRef idx="2">
+            <a:schemeClr val="accent1">
+              <a:shade val="50000"/>
+            </a:schemeClr>
+          </a:lnRef>
+          <a:fillRef idx="1">
+            <a:schemeClr val="accent1"/>
+          </a:fillRef>
+          <a:effectRef idx="0">
+            <a:schemeClr val="accent1"/>
+          </a:effectRef>
+          <a:fontRef idx="minor">
+            <a:schemeClr val="lt1"/>
+          </a:fontRef>
+        </p:style>
+        <p:txBody>
+          <a:bodyPr rtlCol="0" anchor="ctr"/>
+          <a:lstStyle/>
+          <a:p>
+            <a:pPr algn="ctr"/>
+            <a:endParaRPr lang="en-US"/>
           </a:p>
         </p:txBody>
       </p:sp>
@@ -10415,6 +10335,10 @@
             <a:pPr lvl="1">
               <a:buNone/>
             </a:pPr>
+            <a:r>
+              <a:rPr lang="en-US" dirty="0" smtClean="0"/>
+              <a:t>Cash Available : XXXX</a:t>
+            </a:r>
             <a:endParaRPr lang="en-US" dirty="0" smtClean="0"/>
           </a:p>
           <a:p>
@@ -10423,8 +10347,13 @@
             </a:pPr>
             <a:r>
               <a:rPr lang="en-US" dirty="0" smtClean="0"/>
-              <a:t>Enter Amount:</a:t>
-            </a:r>
+              <a:t>Enter </a:t>
+            </a:r>
+            <a:r>
+              <a:rPr lang="en-US" dirty="0" smtClean="0"/>
+              <a:t>Investment Amount: XXXX</a:t>
+            </a:r>
+            <a:endParaRPr lang="en-US" dirty="0" smtClean="0"/>
           </a:p>
           <a:p>
             <a:pPr lvl="1">
@@ -10432,43 +10361,13 @@
             </a:pPr>
             <a:r>
               <a:rPr lang="en-US" dirty="0" smtClean="0"/>
-              <a:t>Enter Date Purchased</a:t>
+              <a:t>Enter Date Purchased: [default is today</a:t>
             </a:r>
             <a:r>
               <a:rPr lang="en-US" dirty="0" smtClean="0"/>
-              <a:t>: [default is today]</a:t>
+              <a:t>]</a:t>
             </a:r>
             <a:endParaRPr lang="en-US" dirty="0" smtClean="0"/>
-          </a:p>
-          <a:p>
-            <a:pPr lvl="1">
-              <a:buNone/>
-            </a:pPr>
-            <a:endParaRPr lang="en-US" dirty="0" smtClean="0"/>
-          </a:p>
-          <a:p>
-            <a:pPr lvl="1">
-              <a:buNone/>
-            </a:pPr>
-            <a:r>
-              <a:rPr lang="en-US" dirty="0" smtClean="0"/>
-              <a:t>		Stock Five</a:t>
-            </a:r>
-          </a:p>
-          <a:p>
-            <a:pPr lvl="1">
-              <a:buNone/>
-            </a:pPr>
-            <a:r>
-              <a:rPr lang="en-US" dirty="0" smtClean="0"/>
-              <a:t>		Stock Six</a:t>
-            </a:r>
-          </a:p>
-          <a:p>
-            <a:pPr>
-              <a:buNone/>
-            </a:pPr>
-            <a:endParaRPr lang="en-US" dirty="0"/>
           </a:p>
         </p:txBody>
       </p:sp>
@@ -10482,7 +10381,7 @@
         </p:nvSpPr>
         <p:spPr>
           <a:xfrm>
-            <a:off x="2362200" y="4572000"/>
+            <a:off x="2057400" y="3657600"/>
             <a:ext cx="2286000" cy="838200"/>
           </a:xfrm>
           <a:prstGeom prst="roundRect">
@@ -10513,90 +10412,6 @@
             <a:r>
               <a:rPr lang="en-US" dirty="0" smtClean="0"/>
               <a:t>Buy</a:t>
-            </a:r>
-            <a:endParaRPr lang="en-US" dirty="0"/>
-          </a:p>
-        </p:txBody>
-      </p:sp>
-      <p:sp>
-        <p:nvSpPr>
-          <p:cNvPr id="7" name="Rectangle 6"/>
-          <p:cNvSpPr/>
-          <p:nvPr/>
-        </p:nvSpPr>
-        <p:spPr>
-          <a:xfrm>
-            <a:off x="1295400" y="3352800"/>
-            <a:ext cx="533400" cy="381000"/>
-          </a:xfrm>
-          <a:prstGeom prst="rect">
-            <a:avLst/>
-          </a:prstGeom>
-        </p:spPr>
-        <p:style>
-          <a:lnRef idx="2">
-            <a:schemeClr val="dk1"/>
-          </a:lnRef>
-          <a:fillRef idx="1">
-            <a:schemeClr val="lt1"/>
-          </a:fillRef>
-          <a:effectRef idx="0">
-            <a:schemeClr val="dk1"/>
-          </a:effectRef>
-          <a:fontRef idx="minor">
-            <a:schemeClr val="dk1"/>
-          </a:fontRef>
-        </p:style>
-        <p:txBody>
-          <a:bodyPr rtlCol="0" anchor="ctr"/>
-          <a:lstStyle/>
-          <a:p>
-            <a:pPr algn="ctr"/>
-            <a:r>
-              <a:rPr lang="en-US" dirty="0" smtClean="0"/>
-              <a:t>10</a:t>
-            </a:r>
-            <a:endParaRPr lang="en-US" dirty="0"/>
-          </a:p>
-        </p:txBody>
-      </p:sp>
-      <p:sp>
-        <p:nvSpPr>
-          <p:cNvPr id="8" name="Rectangle 7"/>
-          <p:cNvSpPr/>
-          <p:nvPr/>
-        </p:nvSpPr>
-        <p:spPr>
-          <a:xfrm>
-            <a:off x="1295400" y="3810000"/>
-            <a:ext cx="533400" cy="381000"/>
-          </a:xfrm>
-          <a:prstGeom prst="rect">
-            <a:avLst/>
-          </a:prstGeom>
-        </p:spPr>
-        <p:style>
-          <a:lnRef idx="2">
-            <a:schemeClr val="dk1"/>
-          </a:lnRef>
-          <a:fillRef idx="1">
-            <a:schemeClr val="lt1"/>
-          </a:fillRef>
-          <a:effectRef idx="0">
-            <a:schemeClr val="dk1"/>
-          </a:effectRef>
-          <a:fontRef idx="minor">
-            <a:schemeClr val="dk1"/>
-          </a:fontRef>
-        </p:style>
-        <p:txBody>
-          <a:bodyPr rtlCol="0" anchor="ctr"/>
-          <a:lstStyle/>
-          <a:p>
-            <a:pPr algn="ctr"/>
-            <a:r>
-              <a:rPr lang="en-US" dirty="0" smtClean="0"/>
-              <a:t>?</a:t>
             </a:r>
             <a:endParaRPr lang="en-US" dirty="0"/>
           </a:p>

</xml_diff>

<commit_message>
Flow.pptx slide 7 changed Nov 11
</commit_message>
<xml_diff>
--- a/handin/Flow.pptx
+++ b/handin/Flow.pptx
@@ -1550,9 +1550,8 @@
           <a:bodyPr/>
           <a:lstStyle/>
           <a:p>
-            <a:fld id="{732979C2-7319-438A-96E4-F9B09D12820E}" type="datetimeFigureOut">
-              <a:rPr lang="en-US" smtClean="0"/>
-              <a:pPr/>
+            <a:fld id="{2E1473E9-663A-461C-BE59-D2D739A251D6}" type="datetime1">
+              <a:rPr lang="en-US" smtClean="0"/>
               <a:t>11/11/2010</a:t>
             </a:fld>
             <a:endParaRPr lang="en-US"/>
@@ -1717,9 +1716,8 @@
           <a:bodyPr/>
           <a:lstStyle/>
           <a:p>
-            <a:fld id="{732979C2-7319-438A-96E4-F9B09D12820E}" type="datetimeFigureOut">
-              <a:rPr lang="en-US" smtClean="0"/>
-              <a:pPr/>
+            <a:fld id="{06D32F85-50B9-49C6-90F2-EE368E42BE70}" type="datetime1">
+              <a:rPr lang="en-US" smtClean="0"/>
               <a:t>11/11/2010</a:t>
             </a:fld>
             <a:endParaRPr lang="en-US"/>
@@ -1894,9 +1892,8 @@
           <a:bodyPr/>
           <a:lstStyle/>
           <a:p>
-            <a:fld id="{732979C2-7319-438A-96E4-F9B09D12820E}" type="datetimeFigureOut">
-              <a:rPr lang="en-US" smtClean="0"/>
-              <a:pPr/>
+            <a:fld id="{79EC5A26-5247-4F19-8552-DABE94A49FA3}" type="datetime1">
+              <a:rPr lang="en-US" smtClean="0"/>
               <a:t>11/11/2010</a:t>
             </a:fld>
             <a:endParaRPr lang="en-US"/>
@@ -2061,9 +2058,8 @@
           <a:bodyPr/>
           <a:lstStyle/>
           <a:p>
-            <a:fld id="{732979C2-7319-438A-96E4-F9B09D12820E}" type="datetimeFigureOut">
-              <a:rPr lang="en-US" smtClean="0"/>
-              <a:pPr/>
+            <a:fld id="{471C6517-EA4C-498F-A2FE-D9E8C8504AB9}" type="datetime1">
+              <a:rPr lang="en-US" smtClean="0"/>
               <a:t>11/11/2010</a:t>
             </a:fld>
             <a:endParaRPr lang="en-US"/>
@@ -2304,9 +2300,8 @@
           <a:bodyPr/>
           <a:lstStyle/>
           <a:p>
-            <a:fld id="{732979C2-7319-438A-96E4-F9B09D12820E}" type="datetimeFigureOut">
-              <a:rPr lang="en-US" smtClean="0"/>
-              <a:pPr/>
+            <a:fld id="{EE3E2F3E-F3D6-423C-B2FA-DC3BC45FCD6F}" type="datetime1">
+              <a:rPr lang="en-US" smtClean="0"/>
               <a:t>11/11/2010</a:t>
             </a:fld>
             <a:endParaRPr lang="en-US"/>
@@ -2589,9 +2584,8 @@
           <a:bodyPr/>
           <a:lstStyle/>
           <a:p>
-            <a:fld id="{732979C2-7319-438A-96E4-F9B09D12820E}" type="datetimeFigureOut">
-              <a:rPr lang="en-US" smtClean="0"/>
-              <a:pPr/>
+            <a:fld id="{6B4F9612-EB05-4A3D-8A8B-18A59A4BCB74}" type="datetime1">
+              <a:rPr lang="en-US" smtClean="0"/>
               <a:t>11/11/2010</a:t>
             </a:fld>
             <a:endParaRPr lang="en-US"/>
@@ -3008,9 +3002,8 @@
           <a:bodyPr/>
           <a:lstStyle/>
           <a:p>
-            <a:fld id="{732979C2-7319-438A-96E4-F9B09D12820E}" type="datetimeFigureOut">
-              <a:rPr lang="en-US" smtClean="0"/>
-              <a:pPr/>
+            <a:fld id="{FCA8BD0F-86A3-4D20-860C-A155CF75F8BD}" type="datetime1">
+              <a:rPr lang="en-US" smtClean="0"/>
               <a:t>11/11/2010</a:t>
             </a:fld>
             <a:endParaRPr lang="en-US"/>
@@ -3123,9 +3116,8 @@
           <a:bodyPr/>
           <a:lstStyle/>
           <a:p>
-            <a:fld id="{732979C2-7319-438A-96E4-F9B09D12820E}" type="datetimeFigureOut">
-              <a:rPr lang="en-US" smtClean="0"/>
-              <a:pPr/>
+            <a:fld id="{0FB6D274-0B61-4F2E-AF3B-CDA3852CB025}" type="datetime1">
+              <a:rPr lang="en-US" smtClean="0"/>
               <a:t>11/11/2010</a:t>
             </a:fld>
             <a:endParaRPr lang="en-US"/>
@@ -3215,9 +3207,8 @@
           <a:bodyPr/>
           <a:lstStyle/>
           <a:p>
-            <a:fld id="{732979C2-7319-438A-96E4-F9B09D12820E}" type="datetimeFigureOut">
-              <a:rPr lang="en-US" smtClean="0"/>
-              <a:pPr/>
+            <a:fld id="{51355D52-41C1-4825-8D94-E99C0B2A22D9}" type="datetime1">
+              <a:rPr lang="en-US" smtClean="0"/>
               <a:t>11/11/2010</a:t>
             </a:fld>
             <a:endParaRPr lang="en-US"/>
@@ -3489,9 +3480,8 @@
           <a:bodyPr/>
           <a:lstStyle/>
           <a:p>
-            <a:fld id="{732979C2-7319-438A-96E4-F9B09D12820E}" type="datetimeFigureOut">
-              <a:rPr lang="en-US" smtClean="0"/>
-              <a:pPr/>
+            <a:fld id="{7AC9C890-E70A-419F-A072-1E4C8A0C9315}" type="datetime1">
+              <a:rPr lang="en-US" smtClean="0"/>
               <a:t>11/11/2010</a:t>
             </a:fld>
             <a:endParaRPr lang="en-US"/>
@@ -3739,9 +3729,8 @@
           <a:bodyPr/>
           <a:lstStyle/>
           <a:p>
-            <a:fld id="{732979C2-7319-438A-96E4-F9B09D12820E}" type="datetimeFigureOut">
-              <a:rPr lang="en-US" smtClean="0"/>
-              <a:pPr/>
+            <a:fld id="{58519D15-FC20-4D38-B270-2A4DCA6CF962}" type="datetime1">
+              <a:rPr lang="en-US" smtClean="0"/>
               <a:t>11/11/2010</a:t>
             </a:fld>
             <a:endParaRPr lang="en-US"/>
@@ -3949,9 +3938,8 @@
             </a:lvl1pPr>
           </a:lstStyle>
           <a:p>
-            <a:fld id="{732979C2-7319-438A-96E4-F9B09D12820E}" type="datetimeFigureOut">
-              <a:rPr lang="en-US" smtClean="0"/>
-              <a:pPr/>
+            <a:fld id="{F8078475-78A6-4A1D-AB20-08B67EB52370}" type="datetime1">
+              <a:rPr lang="en-US" smtClean="0"/>
               <a:t>11/11/2010</a:t>
             </a:fld>
             <a:endParaRPr lang="en-US"/>
@@ -4053,6 +4041,7 @@
     <p:sldLayoutId id="2147483658" r:id="rId10"/>
     <p:sldLayoutId id="2147483659" r:id="rId11"/>
   </p:sldLayoutIdLst>
+  <p:hf hdr="0" ftr="0" dt="0"/>
   <p:txStyles>
     <p:titleStyle>
       <a:lvl1pPr algn="ctr" defTabSz="914400" rtl="0" eaLnBrk="1" latinLnBrk="0" hangingPunct="1">
@@ -5276,6 +5265,30 @@
           </a:fontRef>
         </p:style>
       </p:cxnSp>
+      <p:sp>
+        <p:nvSpPr>
+          <p:cNvPr id="28" name="Slide Number Placeholder 27"/>
+          <p:cNvSpPr>
+            <a:spLocks noGrp="1"/>
+          </p:cNvSpPr>
+          <p:nvPr>
+            <p:ph type="sldNum" sz="quarter" idx="12"/>
+          </p:nvPr>
+        </p:nvSpPr>
+        <p:spPr/>
+        <p:txBody>
+          <a:bodyPr/>
+          <a:lstStyle/>
+          <a:p>
+            <a:fld id="{B0478B60-1448-486C-BA6D-779A9B0B0C87}" type="slidenum">
+              <a:rPr lang="en-US" smtClean="0"/>
+              <a:pPr/>
+              <a:t>1</a:t>
+            </a:fld>
+            <a:endParaRPr lang="en-US"/>
+          </a:p>
+        </p:txBody>
+      </p:sp>
     </p:spTree>
   </p:cSld>
   <p:clrMapOvr>
@@ -5546,6 +5559,30 @@
               <a:t>?</a:t>
             </a:r>
             <a:endParaRPr lang="en-US" dirty="0"/>
+          </a:p>
+        </p:txBody>
+      </p:sp>
+      <p:sp>
+        <p:nvSpPr>
+          <p:cNvPr id="9" name="Slide Number Placeholder 8"/>
+          <p:cNvSpPr>
+            <a:spLocks noGrp="1"/>
+          </p:cNvSpPr>
+          <p:nvPr>
+            <p:ph type="sldNum" sz="quarter" idx="12"/>
+          </p:nvPr>
+        </p:nvSpPr>
+        <p:spPr/>
+        <p:txBody>
+          <a:bodyPr/>
+          <a:lstStyle/>
+          <a:p>
+            <a:fld id="{B0478B60-1448-486C-BA6D-779A9B0B0C87}" type="slidenum">
+              <a:rPr lang="en-US" smtClean="0"/>
+              <a:pPr/>
+              <a:t>10</a:t>
+            </a:fld>
+            <a:endParaRPr lang="en-US"/>
           </a:p>
         </p:txBody>
       </p:sp>
@@ -8456,6 +8493,30 @@
           </a:p>
         </p:txBody>
       </p:sp>
+      <p:sp>
+        <p:nvSpPr>
+          <p:cNvPr id="16" name="Slide Number Placeholder 15"/>
+          <p:cNvSpPr>
+            <a:spLocks noGrp="1"/>
+          </p:cNvSpPr>
+          <p:nvPr>
+            <p:ph type="sldNum" sz="quarter" idx="12"/>
+          </p:nvPr>
+        </p:nvSpPr>
+        <p:spPr/>
+        <p:txBody>
+          <a:bodyPr/>
+          <a:lstStyle/>
+          <a:p>
+            <a:fld id="{B0478B60-1448-486C-BA6D-779A9B0B0C87}" type="slidenum">
+              <a:rPr lang="en-US" smtClean="0"/>
+              <a:pPr/>
+              <a:t>11</a:t>
+            </a:fld>
+            <a:endParaRPr lang="en-US"/>
+          </a:p>
+        </p:txBody>
+      </p:sp>
     </p:spTree>
   </p:cSld>
   <p:clrMapOvr>
@@ -8717,6 +8778,30 @@
           </a:p>
         </p:txBody>
       </p:sp>
+      <p:sp>
+        <p:nvSpPr>
+          <p:cNvPr id="10" name="Slide Number Placeholder 9"/>
+          <p:cNvSpPr>
+            <a:spLocks noGrp="1"/>
+          </p:cNvSpPr>
+          <p:nvPr>
+            <p:ph type="sldNum" sz="quarter" idx="12"/>
+          </p:nvPr>
+        </p:nvSpPr>
+        <p:spPr/>
+        <p:txBody>
+          <a:bodyPr/>
+          <a:lstStyle/>
+          <a:p>
+            <a:fld id="{B0478B60-1448-486C-BA6D-779A9B0B0C87}" type="slidenum">
+              <a:rPr lang="en-US" smtClean="0"/>
+              <a:pPr/>
+              <a:t>2</a:t>
+            </a:fld>
+            <a:endParaRPr lang="en-US"/>
+          </a:p>
+        </p:txBody>
+      </p:sp>
     </p:spTree>
   </p:cSld>
   <p:clrMapOvr>
@@ -8882,6 +8967,30 @@
           </a:p>
         </p:txBody>
       </p:sp>
+      <p:sp>
+        <p:nvSpPr>
+          <p:cNvPr id="5" name="Slide Number Placeholder 4"/>
+          <p:cNvSpPr>
+            <a:spLocks noGrp="1"/>
+          </p:cNvSpPr>
+          <p:nvPr>
+            <p:ph type="sldNum" sz="quarter" idx="12"/>
+          </p:nvPr>
+        </p:nvSpPr>
+        <p:spPr/>
+        <p:txBody>
+          <a:bodyPr/>
+          <a:lstStyle/>
+          <a:p>
+            <a:fld id="{B0478B60-1448-486C-BA6D-779A9B0B0C87}" type="slidenum">
+              <a:rPr lang="en-US" smtClean="0"/>
+              <a:pPr/>
+              <a:t>3</a:t>
+            </a:fld>
+            <a:endParaRPr lang="en-US"/>
+          </a:p>
+        </p:txBody>
+      </p:sp>
     </p:spTree>
   </p:cSld>
   <p:clrMapOvr>
@@ -9378,6 +9487,30 @@
           </a:p>
         </p:txBody>
       </p:sp>
+      <p:sp>
+        <p:nvSpPr>
+          <p:cNvPr id="12" name="Slide Number Placeholder 11"/>
+          <p:cNvSpPr>
+            <a:spLocks noGrp="1"/>
+          </p:cNvSpPr>
+          <p:nvPr>
+            <p:ph type="sldNum" sz="quarter" idx="12"/>
+          </p:nvPr>
+        </p:nvSpPr>
+        <p:spPr/>
+        <p:txBody>
+          <a:bodyPr/>
+          <a:lstStyle/>
+          <a:p>
+            <a:fld id="{B0478B60-1448-486C-BA6D-779A9B0B0C87}" type="slidenum">
+              <a:rPr lang="en-US" smtClean="0"/>
+              <a:pPr/>
+              <a:t>4</a:t>
+            </a:fld>
+            <a:endParaRPr lang="en-US"/>
+          </a:p>
+        </p:txBody>
+      </p:sp>
     </p:spTree>
   </p:cSld>
   <p:clrMapOvr>
@@ -9653,6 +9786,30 @@
           </a:p>
         </p:txBody>
       </p:sp>
+      <p:sp>
+        <p:nvSpPr>
+          <p:cNvPr id="8" name="Slide Number Placeholder 7"/>
+          <p:cNvSpPr>
+            <a:spLocks noGrp="1"/>
+          </p:cNvSpPr>
+          <p:nvPr>
+            <p:ph type="sldNum" sz="quarter" idx="12"/>
+          </p:nvPr>
+        </p:nvSpPr>
+        <p:spPr/>
+        <p:txBody>
+          <a:bodyPr/>
+          <a:lstStyle/>
+          <a:p>
+            <a:fld id="{B0478B60-1448-486C-BA6D-779A9B0B0C87}" type="slidenum">
+              <a:rPr lang="en-US" smtClean="0"/>
+              <a:pPr/>
+              <a:t>5</a:t>
+            </a:fld>
+            <a:endParaRPr lang="en-US"/>
+          </a:p>
+        </p:txBody>
+      </p:sp>
     </p:spTree>
   </p:cSld>
   <p:clrMapOvr>
@@ -9828,6 +9985,30 @@
           </a:p>
         </p:txBody>
       </p:sp>
+      <p:sp>
+        <p:nvSpPr>
+          <p:cNvPr id="6" name="Slide Number Placeholder 5"/>
+          <p:cNvSpPr>
+            <a:spLocks noGrp="1"/>
+          </p:cNvSpPr>
+          <p:nvPr>
+            <p:ph type="sldNum" sz="quarter" idx="12"/>
+          </p:nvPr>
+        </p:nvSpPr>
+        <p:spPr/>
+        <p:txBody>
+          <a:bodyPr/>
+          <a:lstStyle/>
+          <a:p>
+            <a:fld id="{B0478B60-1448-486C-BA6D-779A9B0B0C87}" type="slidenum">
+              <a:rPr lang="en-US" smtClean="0"/>
+              <a:pPr/>
+              <a:t>6</a:t>
+            </a:fld>
+            <a:endParaRPr lang="en-US"/>
+          </a:p>
+        </p:txBody>
+      </p:sp>
     </p:spTree>
   </p:cSld>
   <p:clrMapOvr>
@@ -9900,16 +10081,27 @@
           <a:p>
             <a:r>
               <a:rPr lang="en-US" dirty="0" smtClean="0"/>
-              <a:t>Enter Portfolio Name: </a:t>
-            </a:r>
-          </a:p>
-          <a:p>
-            <a:endParaRPr lang="en-US" dirty="0" smtClean="0"/>
-          </a:p>
-          <a:p>
+              <a:t>Portfolio </a:t>
+            </a:r>
             <a:r>
               <a:rPr lang="en-US" dirty="0" smtClean="0"/>
-              <a:t>Select Trading Strategy [Dropdown] </a:t>
+              <a:t>Name: </a:t>
+            </a:r>
+          </a:p>
+          <a:p>
+            <a:r>
+              <a:rPr lang="en-US" dirty="0" smtClean="0"/>
+              <a:t>Cash Amount:</a:t>
+            </a:r>
+          </a:p>
+          <a:p>
+            <a:r>
+              <a:rPr lang="en-US" dirty="0" smtClean="0"/>
+              <a:t>Select </a:t>
+            </a:r>
+            <a:r>
+              <a:rPr lang="en-US" dirty="0" smtClean="0"/>
+              <a:t>Trading Strategy [Dropdown] </a:t>
             </a:r>
           </a:p>
           <a:p>
@@ -9930,7 +10122,7 @@
         </p:nvSpPr>
         <p:spPr>
           <a:xfrm>
-            <a:off x="1447800" y="4038600"/>
+            <a:off x="1447800" y="4419600"/>
             <a:ext cx="2362200" cy="914400"/>
           </a:xfrm>
           <a:prstGeom prst="roundRect">
@@ -9976,7 +10168,7 @@
         </p:nvSpPr>
         <p:spPr>
           <a:xfrm>
-            <a:off x="4267200" y="4038600"/>
+            <a:off x="4191000" y="4343400"/>
             <a:ext cx="2362200" cy="914400"/>
           </a:xfrm>
           <a:prstGeom prst="roundRect">
@@ -10005,8 +10197,8 @@
           <a:p>
             <a:pPr algn="ctr"/>
             <a:r>
-              <a:rPr lang="en-US" dirty="0" smtClean="0"/>
-              <a:t>Cancel</a:t>
+              <a:rPr lang="en-US" smtClean="0"/>
+              <a:t>Reset</a:t>
             </a:r>
             <a:endParaRPr lang="en-US" dirty="0"/>
           </a:p>
@@ -10020,7 +10212,7 @@
         </p:nvSpPr>
         <p:spPr>
           <a:xfrm>
-            <a:off x="4572000" y="1676400"/>
+            <a:off x="3733800" y="1676400"/>
             <a:ext cx="3200400" cy="457200"/>
           </a:xfrm>
           <a:prstGeom prst="rect">
@@ -10046,6 +10238,68 @@
           <a:lstStyle/>
           <a:p>
             <a:pPr algn="ctr"/>
+            <a:endParaRPr lang="en-US"/>
+          </a:p>
+        </p:txBody>
+      </p:sp>
+      <p:sp>
+        <p:nvSpPr>
+          <p:cNvPr id="7" name="Rectangle 6"/>
+          <p:cNvSpPr/>
+          <p:nvPr/>
+        </p:nvSpPr>
+        <p:spPr>
+          <a:xfrm>
+            <a:off x="3733800" y="2286000"/>
+            <a:ext cx="3200400" cy="457200"/>
+          </a:xfrm>
+          <a:prstGeom prst="rect">
+            <a:avLst/>
+          </a:prstGeom>
+        </p:spPr>
+        <p:style>
+          <a:lnRef idx="2">
+            <a:schemeClr val="dk1"/>
+          </a:lnRef>
+          <a:fillRef idx="1">
+            <a:schemeClr val="lt1"/>
+          </a:fillRef>
+          <a:effectRef idx="0">
+            <a:schemeClr val="dk1"/>
+          </a:effectRef>
+          <a:fontRef idx="minor">
+            <a:schemeClr val="dk1"/>
+          </a:fontRef>
+        </p:style>
+        <p:txBody>
+          <a:bodyPr rtlCol="0" anchor="ctr"/>
+          <a:lstStyle/>
+          <a:p>
+            <a:pPr algn="ctr"/>
+            <a:endParaRPr lang="en-US"/>
+          </a:p>
+        </p:txBody>
+      </p:sp>
+      <p:sp>
+        <p:nvSpPr>
+          <p:cNvPr id="8" name="Slide Number Placeholder 7"/>
+          <p:cNvSpPr>
+            <a:spLocks noGrp="1"/>
+          </p:cNvSpPr>
+          <p:nvPr>
+            <p:ph type="sldNum" sz="quarter" idx="12"/>
+          </p:nvPr>
+        </p:nvSpPr>
+        <p:spPr/>
+        <p:txBody>
+          <a:bodyPr/>
+          <a:lstStyle/>
+          <a:p>
+            <a:fld id="{B0478B60-1448-486C-BA6D-779A9B0B0C87}" type="slidenum">
+              <a:rPr lang="en-US" smtClean="0"/>
+              <a:pPr/>
+              <a:t>7</a:t>
+            </a:fld>
             <a:endParaRPr lang="en-US"/>
           </a:p>
         </p:txBody>
@@ -10257,6 +10511,30 @@
           </a:p>
         </p:txBody>
       </p:sp>
+      <p:sp>
+        <p:nvSpPr>
+          <p:cNvPr id="8" name="Slide Number Placeholder 7"/>
+          <p:cNvSpPr>
+            <a:spLocks noGrp="1"/>
+          </p:cNvSpPr>
+          <p:nvPr>
+            <p:ph type="sldNum" sz="quarter" idx="12"/>
+          </p:nvPr>
+        </p:nvSpPr>
+        <p:spPr/>
+        <p:txBody>
+          <a:bodyPr/>
+          <a:lstStyle/>
+          <a:p>
+            <a:fld id="{B0478B60-1448-486C-BA6D-779A9B0B0C87}" type="slidenum">
+              <a:rPr lang="en-US" smtClean="0"/>
+              <a:pPr/>
+              <a:t>8</a:t>
+            </a:fld>
+            <a:endParaRPr lang="en-US"/>
+          </a:p>
+        </p:txBody>
+      </p:sp>
     </p:spTree>
   </p:cSld>
   <p:clrMapOvr>
@@ -10414,6 +10692,30 @@
               <a:t>Buy</a:t>
             </a:r>
             <a:endParaRPr lang="en-US" dirty="0"/>
+          </a:p>
+        </p:txBody>
+      </p:sp>
+      <p:sp>
+        <p:nvSpPr>
+          <p:cNvPr id="9" name="Slide Number Placeholder 8"/>
+          <p:cNvSpPr>
+            <a:spLocks noGrp="1"/>
+          </p:cNvSpPr>
+          <p:nvPr>
+            <p:ph type="sldNum" sz="quarter" idx="12"/>
+          </p:nvPr>
+        </p:nvSpPr>
+        <p:spPr/>
+        <p:txBody>
+          <a:bodyPr/>
+          <a:lstStyle/>
+          <a:p>
+            <a:fld id="{B0478B60-1448-486C-BA6D-779A9B0B0C87}" type="slidenum">
+              <a:rPr lang="en-US" smtClean="0"/>
+              <a:pPr/>
+              <a:t>9</a:t>
+            </a:fld>
+            <a:endParaRPr lang="en-US"/>
           </a:p>
         </p:txBody>
       </p:sp>

</xml_diff>